<commit_message>
remove cached Rproj file
</commit_message>
<xml_diff>
--- a/figures/main/VLTE_diagram/VLTE_diagram.pptx
+++ b/figures/main/VLTE_diagram/VLTE_diagram.pptx
@@ -104,6 +104,11 @@
       </a:defRPr>
     </a:lvl9pPr>
   </p:defaultTextStyle>
+  <p:extLst>
+    <p:ext uri="{EFAFB233-063F-42B5-8137-9DF3F51BA10A}">
+      <p15:sldGuideLst xmlns:p15="http://schemas.microsoft.com/office/powerpoint/2012/main"/>
+    </p:ext>
+  </p:extLst>
 </p:presentation>
 </file>
 
@@ -238,7 +243,7 @@
           <a:p>
             <a:fld id="{08ADBE64-D089-4171-9DD3-BC80D25548C1}" type="datetimeFigureOut">
               <a:rPr lang="en-US" smtClean="0"/>
-              <a:t>9/27/2025</a:t>
+              <a:t>9/28/2025</a:t>
             </a:fld>
             <a:endParaRPr lang="en-US"/>
           </a:p>
@@ -408,7 +413,7 @@
           <a:p>
             <a:fld id="{08ADBE64-D089-4171-9DD3-BC80D25548C1}" type="datetimeFigureOut">
               <a:rPr lang="en-US" smtClean="0"/>
-              <a:t>9/27/2025</a:t>
+              <a:t>9/28/2025</a:t>
             </a:fld>
             <a:endParaRPr lang="en-US"/>
           </a:p>
@@ -588,7 +593,7 @@
           <a:p>
             <a:fld id="{08ADBE64-D089-4171-9DD3-BC80D25548C1}" type="datetimeFigureOut">
               <a:rPr lang="en-US" smtClean="0"/>
-              <a:t>9/27/2025</a:t>
+              <a:t>9/28/2025</a:t>
             </a:fld>
             <a:endParaRPr lang="en-US"/>
           </a:p>
@@ -758,7 +763,7 @@
           <a:p>
             <a:fld id="{08ADBE64-D089-4171-9DD3-BC80D25548C1}" type="datetimeFigureOut">
               <a:rPr lang="en-US" smtClean="0"/>
-              <a:t>9/27/2025</a:t>
+              <a:t>9/28/2025</a:t>
             </a:fld>
             <a:endParaRPr lang="en-US"/>
           </a:p>
@@ -1004,7 +1009,7 @@
           <a:p>
             <a:fld id="{08ADBE64-D089-4171-9DD3-BC80D25548C1}" type="datetimeFigureOut">
               <a:rPr lang="en-US" smtClean="0"/>
-              <a:t>9/27/2025</a:t>
+              <a:t>9/28/2025</a:t>
             </a:fld>
             <a:endParaRPr lang="en-US"/>
           </a:p>
@@ -1236,7 +1241,7 @@
           <a:p>
             <a:fld id="{08ADBE64-D089-4171-9DD3-BC80D25548C1}" type="datetimeFigureOut">
               <a:rPr lang="en-US" smtClean="0"/>
-              <a:t>9/27/2025</a:t>
+              <a:t>9/28/2025</a:t>
             </a:fld>
             <a:endParaRPr lang="en-US"/>
           </a:p>
@@ -1603,7 +1608,7 @@
           <a:p>
             <a:fld id="{08ADBE64-D089-4171-9DD3-BC80D25548C1}" type="datetimeFigureOut">
               <a:rPr lang="en-US" smtClean="0"/>
-              <a:t>9/27/2025</a:t>
+              <a:t>9/28/2025</a:t>
             </a:fld>
             <a:endParaRPr lang="en-US"/>
           </a:p>
@@ -1721,7 +1726,7 @@
           <a:p>
             <a:fld id="{08ADBE64-D089-4171-9DD3-BC80D25548C1}" type="datetimeFigureOut">
               <a:rPr lang="en-US" smtClean="0"/>
-              <a:t>9/27/2025</a:t>
+              <a:t>9/28/2025</a:t>
             </a:fld>
             <a:endParaRPr lang="en-US"/>
           </a:p>
@@ -1816,7 +1821,7 @@
           <a:p>
             <a:fld id="{08ADBE64-D089-4171-9DD3-BC80D25548C1}" type="datetimeFigureOut">
               <a:rPr lang="en-US" smtClean="0"/>
-              <a:t>9/27/2025</a:t>
+              <a:t>9/28/2025</a:t>
             </a:fld>
             <a:endParaRPr lang="en-US"/>
           </a:p>
@@ -2093,7 +2098,7 @@
           <a:p>
             <a:fld id="{08ADBE64-D089-4171-9DD3-BC80D25548C1}" type="datetimeFigureOut">
               <a:rPr lang="en-US" smtClean="0"/>
-              <a:t>9/27/2025</a:t>
+              <a:t>9/28/2025</a:t>
             </a:fld>
             <a:endParaRPr lang="en-US"/>
           </a:p>
@@ -2346,7 +2351,7 @@
           <a:p>
             <a:fld id="{08ADBE64-D089-4171-9DD3-BC80D25548C1}" type="datetimeFigureOut">
               <a:rPr lang="en-US" smtClean="0"/>
-              <a:t>9/27/2025</a:t>
+              <a:t>9/28/2025</a:t>
             </a:fld>
             <a:endParaRPr lang="en-US"/>
           </a:p>
@@ -2559,7 +2564,7 @@
           <a:p>
             <a:fld id="{08ADBE64-D089-4171-9DD3-BC80D25548C1}" type="datetimeFigureOut">
               <a:rPr lang="en-US" smtClean="0"/>
-              <a:t>9/27/2025</a:t>
+              <a:t>9/28/2025</a:t>
             </a:fld>
             <a:endParaRPr lang="en-US"/>
           </a:p>

</xml_diff>

<commit_message>
add plots for AFEN poster
</commit_message>
<xml_diff>
--- a/figures/main/VLTE_diagram/VLTE_diagram.pptx
+++ b/figures/main/VLTE_diagram/VLTE_diagram.pptx
@@ -243,7 +243,7 @@
           <a:p>
             <a:fld id="{08ADBE64-D089-4171-9DD3-BC80D25548C1}" type="datetimeFigureOut">
               <a:rPr lang="en-US" smtClean="0"/>
-              <a:t>9/28/2025</a:t>
+              <a:t>10/3/2025</a:t>
             </a:fld>
             <a:endParaRPr lang="en-US"/>
           </a:p>
@@ -413,7 +413,7 @@
           <a:p>
             <a:fld id="{08ADBE64-D089-4171-9DD3-BC80D25548C1}" type="datetimeFigureOut">
               <a:rPr lang="en-US" smtClean="0"/>
-              <a:t>9/28/2025</a:t>
+              <a:t>10/3/2025</a:t>
             </a:fld>
             <a:endParaRPr lang="en-US"/>
           </a:p>
@@ -593,7 +593,7 @@
           <a:p>
             <a:fld id="{08ADBE64-D089-4171-9DD3-BC80D25548C1}" type="datetimeFigureOut">
               <a:rPr lang="en-US" smtClean="0"/>
-              <a:t>9/28/2025</a:t>
+              <a:t>10/3/2025</a:t>
             </a:fld>
             <a:endParaRPr lang="en-US"/>
           </a:p>
@@ -763,7 +763,7 @@
           <a:p>
             <a:fld id="{08ADBE64-D089-4171-9DD3-BC80D25548C1}" type="datetimeFigureOut">
               <a:rPr lang="en-US" smtClean="0"/>
-              <a:t>9/28/2025</a:t>
+              <a:t>10/3/2025</a:t>
             </a:fld>
             <a:endParaRPr lang="en-US"/>
           </a:p>
@@ -1009,7 +1009,7 @@
           <a:p>
             <a:fld id="{08ADBE64-D089-4171-9DD3-BC80D25548C1}" type="datetimeFigureOut">
               <a:rPr lang="en-US" smtClean="0"/>
-              <a:t>9/28/2025</a:t>
+              <a:t>10/3/2025</a:t>
             </a:fld>
             <a:endParaRPr lang="en-US"/>
           </a:p>
@@ -1241,7 +1241,7 @@
           <a:p>
             <a:fld id="{08ADBE64-D089-4171-9DD3-BC80D25548C1}" type="datetimeFigureOut">
               <a:rPr lang="en-US" smtClean="0"/>
-              <a:t>9/28/2025</a:t>
+              <a:t>10/3/2025</a:t>
             </a:fld>
             <a:endParaRPr lang="en-US"/>
           </a:p>
@@ -1608,7 +1608,7 @@
           <a:p>
             <a:fld id="{08ADBE64-D089-4171-9DD3-BC80D25548C1}" type="datetimeFigureOut">
               <a:rPr lang="en-US" smtClean="0"/>
-              <a:t>9/28/2025</a:t>
+              <a:t>10/3/2025</a:t>
             </a:fld>
             <a:endParaRPr lang="en-US"/>
           </a:p>
@@ -1726,7 +1726,7 @@
           <a:p>
             <a:fld id="{08ADBE64-D089-4171-9DD3-BC80D25548C1}" type="datetimeFigureOut">
               <a:rPr lang="en-US" smtClean="0"/>
-              <a:t>9/28/2025</a:t>
+              <a:t>10/3/2025</a:t>
             </a:fld>
             <a:endParaRPr lang="en-US"/>
           </a:p>
@@ -1821,7 +1821,7 @@
           <a:p>
             <a:fld id="{08ADBE64-D089-4171-9DD3-BC80D25548C1}" type="datetimeFigureOut">
               <a:rPr lang="en-US" smtClean="0"/>
-              <a:t>9/28/2025</a:t>
+              <a:t>10/3/2025</a:t>
             </a:fld>
             <a:endParaRPr lang="en-US"/>
           </a:p>
@@ -2098,7 +2098,7 @@
           <a:p>
             <a:fld id="{08ADBE64-D089-4171-9DD3-BC80D25548C1}" type="datetimeFigureOut">
               <a:rPr lang="en-US" smtClean="0"/>
-              <a:t>9/28/2025</a:t>
+              <a:t>10/3/2025</a:t>
             </a:fld>
             <a:endParaRPr lang="en-US"/>
           </a:p>
@@ -2351,7 +2351,7 @@
           <a:p>
             <a:fld id="{08ADBE64-D089-4171-9DD3-BC80D25548C1}" type="datetimeFigureOut">
               <a:rPr lang="en-US" smtClean="0"/>
-              <a:t>9/28/2025</a:t>
+              <a:t>10/3/2025</a:t>
             </a:fld>
             <a:endParaRPr lang="en-US"/>
           </a:p>
@@ -2564,7 +2564,7 @@
           <a:p>
             <a:fld id="{08ADBE64-D089-4171-9DD3-BC80D25548C1}" type="datetimeFigureOut">
               <a:rPr lang="en-US" smtClean="0"/>
-              <a:t>9/28/2025</a:t>
+              <a:t>10/3/2025</a:t>
             </a:fld>
             <a:endParaRPr lang="en-US"/>
           </a:p>
@@ -2971,35 +2971,6 @@
       </p:grpSpPr>
       <p:pic>
         <p:nvPicPr>
-          <p:cNvPr id="5" name="Image 4"/>
-          <p:cNvPicPr>
-            <a:picLocks noChangeAspect="1"/>
-          </p:cNvPicPr>
-          <p:nvPr/>
-        </p:nvPicPr>
-        <p:blipFill rotWithShape="1">
-          <a:blip r:embed="rId2" cstate="print">
-            <a:extLst>
-              <a:ext uri="{28A0092B-C50C-407E-A947-70E740481C1C}">
-                <a14:useLocalDpi xmlns:a14="http://schemas.microsoft.com/office/drawing/2010/main" val="0"/>
-              </a:ext>
-            </a:extLst>
-          </a:blip>
-          <a:srcRect t="3465"/>
-          <a:stretch/>
-        </p:blipFill>
-        <p:spPr>
-          <a:xfrm>
-            <a:off x="202928" y="933651"/>
-            <a:ext cx="3200407" cy="5296306"/>
-          </a:xfrm>
-          <a:prstGeom prst="rect">
-            <a:avLst/>
-          </a:prstGeom>
-        </p:spPr>
-      </p:pic>
-      <p:pic>
-        <p:nvPicPr>
           <p:cNvPr id="6" name="Image 5"/>
           <p:cNvPicPr>
             <a:picLocks noChangeAspect="1"/>
@@ -3007,7 +2978,7 @@
           <p:nvPr/>
         </p:nvPicPr>
         <p:blipFill>
-          <a:blip r:embed="rId3" cstate="print">
+          <a:blip r:embed="rId2" cstate="print">
             <a:extLst>
               <a:ext uri="{28A0092B-C50C-407E-A947-70E740481C1C}">
                 <a14:useLocalDpi xmlns:a14="http://schemas.microsoft.com/office/drawing/2010/main" val="0"/>
@@ -3020,7 +2991,7 @@
         </p:blipFill>
         <p:spPr>
           <a:xfrm>
-            <a:off x="3997689" y="738736"/>
+            <a:off x="3814808" y="1731211"/>
             <a:ext cx="3657607" cy="2743206"/>
           </a:xfrm>
           <a:prstGeom prst="rect">
@@ -3036,8 +3007,8 @@
         </p:nvSpPr>
         <p:spPr>
           <a:xfrm>
-            <a:off x="8576109" y="1482291"/>
-            <a:ext cx="2396691" cy="923330"/>
+            <a:off x="8304106" y="198120"/>
+            <a:ext cx="3518751" cy="646331"/>
           </a:xfrm>
           <a:prstGeom prst="rect">
             <a:avLst/>
@@ -3052,13 +3023,7 @@
           <a:p>
             <a:r>
               <a:rPr lang="en-US" dirty="0" smtClean="0"/>
-              <a:t>VL-TE result = TRUE, </a:t>
-            </a:r>
-          </a:p>
-          <a:p>
-            <a:r>
-              <a:rPr lang="en-US" dirty="0" smtClean="0"/>
-              <a:t>TE ratio = 75.4, correlation = 0.8</a:t>
+              <a:t>3. Significant edges are combined into a signed network</a:t>
             </a:r>
             <a:endParaRPr lang="en-US" dirty="0"/>
           </a:p>
@@ -3073,7 +3038,7 @@
           <p:nvPr/>
         </p:nvPicPr>
         <p:blipFill rotWithShape="1">
-          <a:blip r:embed="rId4" cstate="print">
+          <a:blip r:embed="rId3" cstate="print">
             <a:extLst>
               <a:ext uri="{28A0092B-C50C-407E-A947-70E740481C1C}">
                 <a14:useLocalDpi xmlns:a14="http://schemas.microsoft.com/office/drawing/2010/main" val="0"/>
@@ -3085,14 +3050,295 @@
         </p:blipFill>
         <p:spPr>
           <a:xfrm>
-            <a:off x="7741916" y="3195587"/>
-            <a:ext cx="3657607" cy="3303875"/>
+            <a:off x="8255027" y="1050785"/>
+            <a:ext cx="3425385" cy="3094111"/>
           </a:xfrm>
           <a:prstGeom prst="rect">
             <a:avLst/>
           </a:prstGeom>
         </p:spPr>
       </p:pic>
+      <p:pic>
+        <p:nvPicPr>
+          <p:cNvPr id="2" name="Image 1"/>
+          <p:cNvPicPr>
+            <a:picLocks noChangeAspect="1"/>
+          </p:cNvPicPr>
+          <p:nvPr/>
+        </p:nvPicPr>
+        <p:blipFill>
+          <a:blip r:embed="rId4" cstate="print">
+            <a:extLst>
+              <a:ext uri="{28A0092B-C50C-407E-A947-70E740481C1C}">
+                <a14:useLocalDpi xmlns:a14="http://schemas.microsoft.com/office/drawing/2010/main" val="0"/>
+              </a:ext>
+            </a:extLst>
+          </a:blip>
+          <a:stretch>
+            <a:fillRect/>
+          </a:stretch>
+        </p:blipFill>
+        <p:spPr>
+          <a:xfrm>
+            <a:off x="336876" y="1566333"/>
+            <a:ext cx="2695320" cy="4620546"/>
+          </a:xfrm>
+          <a:prstGeom prst="rect">
+            <a:avLst/>
+          </a:prstGeom>
+        </p:spPr>
+      </p:pic>
+      <p:sp>
+        <p:nvSpPr>
+          <p:cNvPr id="3" name="ZoneTexte 2"/>
+          <p:cNvSpPr txBox="1"/>
+          <p:nvPr/>
+        </p:nvSpPr>
+        <p:spPr>
+          <a:xfrm>
+            <a:off x="336875" y="198120"/>
+            <a:ext cx="3119120" cy="923330"/>
+          </a:xfrm>
+          <a:prstGeom prst="rect">
+            <a:avLst/>
+          </a:prstGeom>
+          <a:noFill/>
+          <a:ln>
+            <a:noFill/>
+          </a:ln>
+        </p:spPr>
+        <p:txBody>
+          <a:bodyPr wrap="square" rtlCol="0">
+            <a:spAutoFit/>
+          </a:bodyPr>
+          <a:lstStyle/>
+          <a:p>
+            <a:r>
+              <a:rPr lang="en-US" dirty="0" smtClean="0"/>
+              <a:t>1. For each ORO, metrics of nodes in the publication to action network are assembled</a:t>
+            </a:r>
+            <a:endParaRPr lang="en-US" dirty="0"/>
+          </a:p>
+        </p:txBody>
+      </p:sp>
+      <p:sp>
+        <p:nvSpPr>
+          <p:cNvPr id="4" name="ZoneTexte 3"/>
+          <p:cNvSpPr txBox="1"/>
+          <p:nvPr/>
+        </p:nvSpPr>
+        <p:spPr>
+          <a:xfrm>
+            <a:off x="3965515" y="1050785"/>
+            <a:ext cx="2797387" cy="430887"/>
+          </a:xfrm>
+          <a:prstGeom prst="rect">
+            <a:avLst/>
+          </a:prstGeom>
+          <a:noFill/>
+        </p:spPr>
+        <p:txBody>
+          <a:bodyPr wrap="square" rtlCol="0">
+            <a:spAutoFit/>
+          </a:bodyPr>
+          <a:lstStyle/>
+          <a:p>
+            <a:r>
+              <a:rPr lang="en-US" sz="1100" i="1" dirty="0" smtClean="0"/>
+              <a:t>(example showing from legislation (node X) to action (node Y))</a:t>
+            </a:r>
+            <a:endParaRPr lang="en-US" sz="1100" i="1" dirty="0"/>
+          </a:p>
+        </p:txBody>
+      </p:sp>
+      <p:sp>
+        <p:nvSpPr>
+          <p:cNvPr id="8" name="Rectangle 7"/>
+          <p:cNvSpPr/>
+          <p:nvPr/>
+        </p:nvSpPr>
+        <p:spPr>
+          <a:xfrm>
+            <a:off x="3974533" y="198120"/>
+            <a:ext cx="3129000" cy="923330"/>
+          </a:xfrm>
+          <a:prstGeom prst="rect">
+            <a:avLst/>
+          </a:prstGeom>
+        </p:spPr>
+        <p:txBody>
+          <a:bodyPr wrap="square">
+            <a:spAutoFit/>
+          </a:bodyPr>
+          <a:lstStyle/>
+          <a:p>
+            <a:r>
+              <a:rPr lang="en-US" dirty="0" smtClean="0"/>
+              <a:t>2. Each </a:t>
+            </a:r>
+            <a:r>
+              <a:rPr lang="en-US" dirty="0"/>
+              <a:t>pair of metrics evaluated using </a:t>
+            </a:r>
+            <a:r>
+              <a:rPr lang="en-US" dirty="0" smtClean="0"/>
+              <a:t>variable-lag transfer entropy</a:t>
+            </a:r>
+            <a:endParaRPr lang="en-US" dirty="0"/>
+          </a:p>
+        </p:txBody>
+      </p:sp>
+      <p:sp>
+        <p:nvSpPr>
+          <p:cNvPr id="10" name="ZoneTexte 9"/>
+          <p:cNvSpPr txBox="1"/>
+          <p:nvPr/>
+        </p:nvSpPr>
+        <p:spPr>
+          <a:xfrm>
+            <a:off x="336875" y="1105980"/>
+            <a:ext cx="2797387" cy="261610"/>
+          </a:xfrm>
+          <a:prstGeom prst="rect">
+            <a:avLst/>
+          </a:prstGeom>
+          <a:noFill/>
+        </p:spPr>
+        <p:txBody>
+          <a:bodyPr wrap="square" rtlCol="0">
+            <a:spAutoFit/>
+          </a:bodyPr>
+          <a:lstStyle/>
+          <a:p>
+            <a:r>
+              <a:rPr lang="en-US" sz="1100" i="1" dirty="0" smtClean="0"/>
+              <a:t>(example showing Incr. Efficiency)</a:t>
+            </a:r>
+            <a:endParaRPr lang="en-US" sz="1100" i="1" dirty="0"/>
+          </a:p>
+        </p:txBody>
+      </p:sp>
+      <p:sp>
+        <p:nvSpPr>
+          <p:cNvPr id="11" name="ZoneTexte 10"/>
+          <p:cNvSpPr txBox="1"/>
+          <p:nvPr/>
+        </p:nvSpPr>
+        <p:spPr>
+          <a:xfrm>
+            <a:off x="3835400" y="4639733"/>
+            <a:ext cx="3691467" cy="1200329"/>
+          </a:xfrm>
+          <a:prstGeom prst="rect">
+            <a:avLst/>
+          </a:prstGeom>
+          <a:noFill/>
+        </p:spPr>
+        <p:txBody>
+          <a:bodyPr wrap="square" rtlCol="0">
+            <a:spAutoFit/>
+          </a:bodyPr>
+          <a:lstStyle/>
+          <a:p>
+            <a:r>
+              <a:rPr lang="en-US" sz="1200" dirty="0" smtClean="0"/>
+              <a:t>Time series of node X adjusted to match Y using dynamic time warping in order to calculate variable-lag transfer entropy (VL-TE).</a:t>
+            </a:r>
+          </a:p>
+          <a:p>
+            <a:endParaRPr lang="en-US" sz="1200" dirty="0" smtClean="0"/>
+          </a:p>
+          <a:p>
+            <a:r>
+              <a:rPr lang="en-US" sz="1200" dirty="0"/>
+              <a:t>VL-TE </a:t>
+            </a:r>
+            <a:r>
+              <a:rPr lang="en-US" sz="1200" dirty="0" smtClean="0"/>
+              <a:t>result: Significant, TE </a:t>
+            </a:r>
+            <a:r>
+              <a:rPr lang="en-US" sz="1200" dirty="0"/>
+              <a:t>ratio = 75.4, correlation = 0.8</a:t>
+            </a:r>
+          </a:p>
+          <a:p>
+            <a:endParaRPr lang="en-US" sz="1200" dirty="0"/>
+          </a:p>
+        </p:txBody>
+      </p:sp>
+      <p:cxnSp>
+        <p:nvCxnSpPr>
+          <p:cNvPr id="16" name="Connecteur droit avec flèche 15"/>
+          <p:cNvCxnSpPr/>
+          <p:nvPr/>
+        </p:nvCxnSpPr>
+        <p:spPr>
+          <a:xfrm flipV="1">
+            <a:off x="3032196" y="2523067"/>
+            <a:ext cx="1328137" cy="1058334"/>
+          </a:xfrm>
+          <a:prstGeom prst="straightConnector1">
+            <a:avLst/>
+          </a:prstGeom>
+          <a:ln w="19050">
+            <a:solidFill>
+              <a:schemeClr val="tx1"/>
+            </a:solidFill>
+            <a:tailEnd type="triangle"/>
+          </a:ln>
+        </p:spPr>
+        <p:style>
+          <a:lnRef idx="1">
+            <a:schemeClr val="accent1"/>
+          </a:lnRef>
+          <a:fillRef idx="0">
+            <a:schemeClr val="accent1"/>
+          </a:fillRef>
+          <a:effectRef idx="0">
+            <a:schemeClr val="accent1"/>
+          </a:effectRef>
+          <a:fontRef idx="minor">
+            <a:schemeClr val="tx1"/>
+          </a:fontRef>
+        </p:style>
+      </p:cxnSp>
+      <p:cxnSp>
+        <p:nvCxnSpPr>
+          <p:cNvPr id="17" name="Connecteur droit avec flèche 16"/>
+          <p:cNvCxnSpPr/>
+          <p:nvPr/>
+        </p:nvCxnSpPr>
+        <p:spPr>
+          <a:xfrm flipV="1">
+            <a:off x="3032196" y="3318933"/>
+            <a:ext cx="1446671" cy="2387767"/>
+          </a:xfrm>
+          <a:prstGeom prst="straightConnector1">
+            <a:avLst/>
+          </a:prstGeom>
+          <a:ln w="19050">
+            <a:solidFill>
+              <a:schemeClr val="tx1"/>
+            </a:solidFill>
+            <a:tailEnd type="triangle"/>
+          </a:ln>
+        </p:spPr>
+        <p:style>
+          <a:lnRef idx="1">
+            <a:schemeClr val="accent1"/>
+          </a:lnRef>
+          <a:fillRef idx="0">
+            <a:schemeClr val="accent1"/>
+          </a:fillRef>
+          <a:effectRef idx="0">
+            <a:schemeClr val="accent1"/>
+          </a:effectRef>
+          <a:fontRef idx="minor">
+            <a:schemeClr val="tx1"/>
+          </a:fontRef>
+        </p:style>
+      </p:cxnSp>
     </p:spTree>
     <p:extLst>
       <p:ext uri="{BB962C8B-B14F-4D97-AF65-F5344CB8AC3E}">
@@ -3103,6 +3349,13 @@
   <p:clrMapOvr>
     <a:masterClrMapping/>
   </p:clrMapOvr>
+  <p:timing>
+    <p:tnLst>
+      <p:par>
+        <p:cTn id="1" dur="indefinite" restart="never" nodeType="tmRoot"/>
+      </p:par>
+    </p:tnLst>
+  </p:timing>
 </p:sld>
 </file>
 

</xml_diff>

<commit_message>
try to make arrows clearer in network plots
</commit_message>
<xml_diff>
--- a/figures/main/VLTE_diagram/VLTE_diagram.pptx
+++ b/figures/main/VLTE_diagram/VLTE_diagram.pptx
@@ -243,7 +243,7 @@
           <a:p>
             <a:fld id="{08ADBE64-D089-4171-9DD3-BC80D25548C1}" type="datetimeFigureOut">
               <a:rPr lang="en-US" smtClean="0"/>
-              <a:t>10/3/2025</a:t>
+              <a:t>10/16/2025</a:t>
             </a:fld>
             <a:endParaRPr lang="en-US"/>
           </a:p>
@@ -413,7 +413,7 @@
           <a:p>
             <a:fld id="{08ADBE64-D089-4171-9DD3-BC80D25548C1}" type="datetimeFigureOut">
               <a:rPr lang="en-US" smtClean="0"/>
-              <a:t>10/3/2025</a:t>
+              <a:t>10/16/2025</a:t>
             </a:fld>
             <a:endParaRPr lang="en-US"/>
           </a:p>
@@ -593,7 +593,7 @@
           <a:p>
             <a:fld id="{08ADBE64-D089-4171-9DD3-BC80D25548C1}" type="datetimeFigureOut">
               <a:rPr lang="en-US" smtClean="0"/>
-              <a:t>10/3/2025</a:t>
+              <a:t>10/16/2025</a:t>
             </a:fld>
             <a:endParaRPr lang="en-US"/>
           </a:p>
@@ -763,7 +763,7 @@
           <a:p>
             <a:fld id="{08ADBE64-D089-4171-9DD3-BC80D25548C1}" type="datetimeFigureOut">
               <a:rPr lang="en-US" smtClean="0"/>
-              <a:t>10/3/2025</a:t>
+              <a:t>10/16/2025</a:t>
             </a:fld>
             <a:endParaRPr lang="en-US"/>
           </a:p>
@@ -1009,7 +1009,7 @@
           <a:p>
             <a:fld id="{08ADBE64-D089-4171-9DD3-BC80D25548C1}" type="datetimeFigureOut">
               <a:rPr lang="en-US" smtClean="0"/>
-              <a:t>10/3/2025</a:t>
+              <a:t>10/16/2025</a:t>
             </a:fld>
             <a:endParaRPr lang="en-US"/>
           </a:p>
@@ -1241,7 +1241,7 @@
           <a:p>
             <a:fld id="{08ADBE64-D089-4171-9DD3-BC80D25548C1}" type="datetimeFigureOut">
               <a:rPr lang="en-US" smtClean="0"/>
-              <a:t>10/3/2025</a:t>
+              <a:t>10/16/2025</a:t>
             </a:fld>
             <a:endParaRPr lang="en-US"/>
           </a:p>
@@ -1608,7 +1608,7 @@
           <a:p>
             <a:fld id="{08ADBE64-D089-4171-9DD3-BC80D25548C1}" type="datetimeFigureOut">
               <a:rPr lang="en-US" smtClean="0"/>
-              <a:t>10/3/2025</a:t>
+              <a:t>10/16/2025</a:t>
             </a:fld>
             <a:endParaRPr lang="en-US"/>
           </a:p>
@@ -1726,7 +1726,7 @@
           <a:p>
             <a:fld id="{08ADBE64-D089-4171-9DD3-BC80D25548C1}" type="datetimeFigureOut">
               <a:rPr lang="en-US" smtClean="0"/>
-              <a:t>10/3/2025</a:t>
+              <a:t>10/16/2025</a:t>
             </a:fld>
             <a:endParaRPr lang="en-US"/>
           </a:p>
@@ -1821,7 +1821,7 @@
           <a:p>
             <a:fld id="{08ADBE64-D089-4171-9DD3-BC80D25548C1}" type="datetimeFigureOut">
               <a:rPr lang="en-US" smtClean="0"/>
-              <a:t>10/3/2025</a:t>
+              <a:t>10/16/2025</a:t>
             </a:fld>
             <a:endParaRPr lang="en-US"/>
           </a:p>
@@ -2098,7 +2098,7 @@
           <a:p>
             <a:fld id="{08ADBE64-D089-4171-9DD3-BC80D25548C1}" type="datetimeFigureOut">
               <a:rPr lang="en-US" smtClean="0"/>
-              <a:t>10/3/2025</a:t>
+              <a:t>10/16/2025</a:t>
             </a:fld>
             <a:endParaRPr lang="en-US"/>
           </a:p>
@@ -2351,7 +2351,7 @@
           <a:p>
             <a:fld id="{08ADBE64-D089-4171-9DD3-BC80D25548C1}" type="datetimeFigureOut">
               <a:rPr lang="en-US" smtClean="0"/>
-              <a:t>10/3/2025</a:t>
+              <a:t>10/16/2025</a:t>
             </a:fld>
             <a:endParaRPr lang="en-US"/>
           </a:p>
@@ -2564,7 +2564,7 @@
           <a:p>
             <a:fld id="{08ADBE64-D089-4171-9DD3-BC80D25548C1}" type="datetimeFigureOut">
               <a:rPr lang="en-US" smtClean="0"/>
-              <a:t>10/3/2025</a:t>
+              <a:t>10/16/2025</a:t>
             </a:fld>
             <a:endParaRPr lang="en-US"/>
           </a:p>
@@ -3031,35 +3031,6 @@
       </p:sp>
       <p:pic>
         <p:nvPicPr>
-          <p:cNvPr id="9" name="Image 8"/>
-          <p:cNvPicPr>
-            <a:picLocks noChangeAspect="1"/>
-          </p:cNvPicPr>
-          <p:nvPr/>
-        </p:nvPicPr>
-        <p:blipFill rotWithShape="1">
-          <a:blip r:embed="rId3" cstate="print">
-            <a:extLst>
-              <a:ext uri="{28A0092B-C50C-407E-A947-70E740481C1C}">
-                <a14:useLocalDpi xmlns:a14="http://schemas.microsoft.com/office/drawing/2010/main" val="0"/>
-              </a:ext>
-            </a:extLst>
-          </a:blip>
-          <a:srcRect t="9671"/>
-          <a:stretch/>
-        </p:blipFill>
-        <p:spPr>
-          <a:xfrm>
-            <a:off x="8255027" y="1050785"/>
-            <a:ext cx="3425385" cy="3094111"/>
-          </a:xfrm>
-          <a:prstGeom prst="rect">
-            <a:avLst/>
-          </a:prstGeom>
-        </p:spPr>
-      </p:pic>
-      <p:pic>
-        <p:nvPicPr>
           <p:cNvPr id="2" name="Image 1"/>
           <p:cNvPicPr>
             <a:picLocks noChangeAspect="1"/>
@@ -3067,7 +3038,7 @@
           <p:nvPr/>
         </p:nvPicPr>
         <p:blipFill>
-          <a:blip r:embed="rId4" cstate="print">
+          <a:blip r:embed="rId3" cstate="print">
             <a:extLst>
               <a:ext uri="{28A0092B-C50C-407E-A947-70E740481C1C}">
                 <a14:useLocalDpi xmlns:a14="http://schemas.microsoft.com/office/drawing/2010/main" val="0"/>
@@ -3339,6 +3310,35 @@
           </a:fontRef>
         </p:style>
       </p:cxnSp>
+      <p:pic>
+        <p:nvPicPr>
+          <p:cNvPr id="5" name="Image 4"/>
+          <p:cNvPicPr>
+            <a:picLocks noChangeAspect="1"/>
+          </p:cNvPicPr>
+          <p:nvPr/>
+        </p:nvPicPr>
+        <p:blipFill rotWithShape="1">
+          <a:blip r:embed="rId4" cstate="print">
+            <a:extLst>
+              <a:ext uri="{28A0092B-C50C-407E-A947-70E740481C1C}">
+                <a14:useLocalDpi xmlns:a14="http://schemas.microsoft.com/office/drawing/2010/main" val="0"/>
+              </a:ext>
+            </a:extLst>
+          </a:blip>
+          <a:srcRect t="15526"/>
+          <a:stretch/>
+        </p:blipFill>
+        <p:spPr>
+          <a:xfrm>
+            <a:off x="8234677" y="1121450"/>
+            <a:ext cx="3657607" cy="3089713"/>
+          </a:xfrm>
+          <a:prstGeom prst="rect">
+            <a:avLst/>
+          </a:prstGeom>
+        </p:spPr>
+      </p:pic>
     </p:spTree>
     <p:extLst>
       <p:ext uri="{BB962C8B-B14F-4D97-AF65-F5344CB8AC3E}">

</xml_diff>

<commit_message>
move legend on conceptual network and qnm figure to bottom, and re-write VLTE diagram figure with new network colours
</commit_message>
<xml_diff>
--- a/figures/main/VLTE_diagram/VLTE_diagram.pptx
+++ b/figures/main/VLTE_diagram/VLTE_diagram.pptx
@@ -243,7 +243,7 @@
           <a:p>
             <a:fld id="{08ADBE64-D089-4171-9DD3-BC80D25548C1}" type="datetimeFigureOut">
               <a:rPr lang="en-US" smtClean="0"/>
-              <a:t>10/16/2025</a:t>
+              <a:t>11/11/2025</a:t>
             </a:fld>
             <a:endParaRPr lang="en-US"/>
           </a:p>
@@ -413,7 +413,7 @@
           <a:p>
             <a:fld id="{08ADBE64-D089-4171-9DD3-BC80D25548C1}" type="datetimeFigureOut">
               <a:rPr lang="en-US" smtClean="0"/>
-              <a:t>10/16/2025</a:t>
+              <a:t>11/11/2025</a:t>
             </a:fld>
             <a:endParaRPr lang="en-US"/>
           </a:p>
@@ -593,7 +593,7 @@
           <a:p>
             <a:fld id="{08ADBE64-D089-4171-9DD3-BC80D25548C1}" type="datetimeFigureOut">
               <a:rPr lang="en-US" smtClean="0"/>
-              <a:t>10/16/2025</a:t>
+              <a:t>11/11/2025</a:t>
             </a:fld>
             <a:endParaRPr lang="en-US"/>
           </a:p>
@@ -763,7 +763,7 @@
           <a:p>
             <a:fld id="{08ADBE64-D089-4171-9DD3-BC80D25548C1}" type="datetimeFigureOut">
               <a:rPr lang="en-US" smtClean="0"/>
-              <a:t>10/16/2025</a:t>
+              <a:t>11/11/2025</a:t>
             </a:fld>
             <a:endParaRPr lang="en-US"/>
           </a:p>
@@ -1009,7 +1009,7 @@
           <a:p>
             <a:fld id="{08ADBE64-D089-4171-9DD3-BC80D25548C1}" type="datetimeFigureOut">
               <a:rPr lang="en-US" smtClean="0"/>
-              <a:t>10/16/2025</a:t>
+              <a:t>11/11/2025</a:t>
             </a:fld>
             <a:endParaRPr lang="en-US"/>
           </a:p>
@@ -1241,7 +1241,7 @@
           <a:p>
             <a:fld id="{08ADBE64-D089-4171-9DD3-BC80D25548C1}" type="datetimeFigureOut">
               <a:rPr lang="en-US" smtClean="0"/>
-              <a:t>10/16/2025</a:t>
+              <a:t>11/11/2025</a:t>
             </a:fld>
             <a:endParaRPr lang="en-US"/>
           </a:p>
@@ -1608,7 +1608,7 @@
           <a:p>
             <a:fld id="{08ADBE64-D089-4171-9DD3-BC80D25548C1}" type="datetimeFigureOut">
               <a:rPr lang="en-US" smtClean="0"/>
-              <a:t>10/16/2025</a:t>
+              <a:t>11/11/2025</a:t>
             </a:fld>
             <a:endParaRPr lang="en-US"/>
           </a:p>
@@ -1726,7 +1726,7 @@
           <a:p>
             <a:fld id="{08ADBE64-D089-4171-9DD3-BC80D25548C1}" type="datetimeFigureOut">
               <a:rPr lang="en-US" smtClean="0"/>
-              <a:t>10/16/2025</a:t>
+              <a:t>11/11/2025</a:t>
             </a:fld>
             <a:endParaRPr lang="en-US"/>
           </a:p>
@@ -1821,7 +1821,7 @@
           <a:p>
             <a:fld id="{08ADBE64-D089-4171-9DD3-BC80D25548C1}" type="datetimeFigureOut">
               <a:rPr lang="en-US" smtClean="0"/>
-              <a:t>10/16/2025</a:t>
+              <a:t>11/11/2025</a:t>
             </a:fld>
             <a:endParaRPr lang="en-US"/>
           </a:p>
@@ -2098,7 +2098,7 @@
           <a:p>
             <a:fld id="{08ADBE64-D089-4171-9DD3-BC80D25548C1}" type="datetimeFigureOut">
               <a:rPr lang="en-US" smtClean="0"/>
-              <a:t>10/16/2025</a:t>
+              <a:t>11/11/2025</a:t>
             </a:fld>
             <a:endParaRPr lang="en-US"/>
           </a:p>
@@ -2351,7 +2351,7 @@
           <a:p>
             <a:fld id="{08ADBE64-D089-4171-9DD3-BC80D25548C1}" type="datetimeFigureOut">
               <a:rPr lang="en-US" smtClean="0"/>
-              <a:t>10/16/2025</a:t>
+              <a:t>11/11/2025</a:t>
             </a:fld>
             <a:endParaRPr lang="en-US"/>
           </a:p>
@@ -2564,7 +2564,7 @@
           <a:p>
             <a:fld id="{08ADBE64-D089-4171-9DD3-BC80D25548C1}" type="datetimeFigureOut">
               <a:rPr lang="en-US" smtClean="0"/>
-              <a:t>10/16/2025</a:t>
+              <a:t>11/11/2025</a:t>
             </a:fld>
             <a:endParaRPr lang="en-US"/>
           </a:p>
@@ -3101,7 +3101,7 @@
         <p:spPr>
           <a:xfrm>
             <a:off x="3965515" y="1050785"/>
-            <a:ext cx="2797387" cy="430887"/>
+            <a:ext cx="2797387" cy="523220"/>
           </a:xfrm>
           <a:prstGeom prst="rect">
             <a:avLst/>
@@ -3115,10 +3115,10 @@
           <a:lstStyle/>
           <a:p>
             <a:r>
-              <a:rPr lang="en-US" sz="1100" i="1" dirty="0" smtClean="0"/>
+              <a:rPr lang="en-US" sz="1400" i="1" dirty="0" smtClean="0"/>
               <a:t>(example showing from legislation (node X) to action (node Y))</a:t>
             </a:r>
-            <a:endParaRPr lang="en-US" sz="1100" i="1" dirty="0"/>
+            <a:endParaRPr lang="en-US" sz="1400" i="1" dirty="0"/>
           </a:p>
         </p:txBody>
       </p:sp>
@@ -3168,7 +3168,7 @@
         <p:spPr>
           <a:xfrm>
             <a:off x="336875" y="1105980"/>
-            <a:ext cx="2797387" cy="261610"/>
+            <a:ext cx="2797387" cy="307777"/>
           </a:xfrm>
           <a:prstGeom prst="rect">
             <a:avLst/>
@@ -3182,10 +3182,10 @@
           <a:lstStyle/>
           <a:p>
             <a:r>
-              <a:rPr lang="en-US" sz="1100" i="1" dirty="0" smtClean="0"/>
+              <a:rPr lang="en-US" sz="1400" i="1" dirty="0" smtClean="0"/>
               <a:t>(example showing Incr. Efficiency)</a:t>
             </a:r>
-            <a:endParaRPr lang="en-US" sz="1100" i="1" dirty="0"/>
+            <a:endParaRPr lang="en-US" sz="1400" i="1" dirty="0"/>
           </a:p>
         </p:txBody>
       </p:sp>
@@ -3198,7 +3198,7 @@
         <p:spPr>
           <a:xfrm>
             <a:off x="3835400" y="4639733"/>
-            <a:ext cx="3691467" cy="1200329"/>
+            <a:ext cx="3691467" cy="2062103"/>
           </a:xfrm>
           <a:prstGeom prst="rect">
             <a:avLst/>
@@ -3212,29 +3212,29 @@
           <a:lstStyle/>
           <a:p>
             <a:r>
-              <a:rPr lang="en-US" sz="1200" dirty="0" smtClean="0"/>
+              <a:rPr lang="en-US" sz="1600" dirty="0" smtClean="0"/>
               <a:t>Time series of node X adjusted to match Y using dynamic time warping in order to calculate variable-lag transfer entropy (VL-TE).</a:t>
             </a:r>
           </a:p>
           <a:p>
-            <a:endParaRPr lang="en-US" sz="1200" dirty="0" smtClean="0"/>
-          </a:p>
-          <a:p>
-            <a:r>
-              <a:rPr lang="en-US" sz="1200" dirty="0"/>
+            <a:endParaRPr lang="en-US" sz="1600" dirty="0" smtClean="0"/>
+          </a:p>
+          <a:p>
+            <a:r>
+              <a:rPr lang="en-US" sz="1600" dirty="0"/>
               <a:t>VL-TE </a:t>
             </a:r>
             <a:r>
-              <a:rPr lang="en-US" sz="1200" dirty="0" smtClean="0"/>
+              <a:rPr lang="en-US" sz="1600" dirty="0" smtClean="0"/>
               <a:t>result: Significant, TE </a:t>
             </a:r>
             <a:r>
-              <a:rPr lang="en-US" sz="1200" dirty="0"/>
+              <a:rPr lang="en-US" sz="1600" dirty="0"/>
               <a:t>ratio = 75.4, correlation = 0.8</a:t>
             </a:r>
           </a:p>
           <a:p>
-            <a:endParaRPr lang="en-US" sz="1200" dirty="0"/>
+            <a:endParaRPr lang="en-US" sz="1600" dirty="0"/>
           </a:p>
         </p:txBody>
       </p:sp>
@@ -3312,7 +3312,7 @@
       </p:cxnSp>
       <p:pic>
         <p:nvPicPr>
-          <p:cNvPr id="5" name="Image 4"/>
+          <p:cNvPr id="9" name="Image 8"/>
           <p:cNvPicPr>
             <a:picLocks noChangeAspect="1"/>
           </p:cNvPicPr>
@@ -3326,13 +3326,13 @@
               </a:ext>
             </a:extLst>
           </a:blip>
-          <a:srcRect t="15526"/>
+          <a:srcRect t="15805"/>
           <a:stretch/>
         </p:blipFill>
         <p:spPr>
           <a:xfrm>
-            <a:off x="8234677" y="1121450"/>
-            <a:ext cx="3657607" cy="3089713"/>
+            <a:off x="8159180" y="1512475"/>
+            <a:ext cx="3657607" cy="3079518"/>
           </a:xfrm>
           <a:prstGeom prst="rect">
             <a:avLst/>

</xml_diff>